<commit_message>
Fix AddSavingCommand sequence diagram border issue, add general parser diagram
</commit_message>
<xml_diff>
--- a/docs/diagrams/AddSavingCommand.pptx
+++ b/docs/diagrams/AddSavingCommand.pptx
@@ -104,6 +104,11 @@
       </a:defRPr>
     </a:lvl9pPr>
   </p:defaultTextStyle>
+  <p:extLst>
+    <p:ext uri="{EFAFB233-063F-42B5-8137-9DF3F51BA10A}">
+      <p15:sldGuideLst xmlns:p15="http://schemas.microsoft.com/office/powerpoint/2012/main"/>
+    </p:ext>
+  </p:extLst>
 </p:presentation>
 </file>
 
@@ -256,7 +261,7 @@
           <a:p>
             <a:fld id="{6CBBC5D8-5190-7F47-8A60-C64E9CB85285}" type="datetimeFigureOut">
               <a:rPr lang="en-US" smtClean="0"/>
-              <a:t>10/22/19</a:t>
+              <a:t>10/24/2019</a:t>
             </a:fld>
             <a:endParaRPr lang="en-US"/>
           </a:p>
@@ -456,7 +461,7 @@
           <a:p>
             <a:fld id="{6CBBC5D8-5190-7F47-8A60-C64E9CB85285}" type="datetimeFigureOut">
               <a:rPr lang="en-US" smtClean="0"/>
-              <a:t>10/22/19</a:t>
+              <a:t>10/24/2019</a:t>
             </a:fld>
             <a:endParaRPr lang="en-US"/>
           </a:p>
@@ -666,7 +671,7 @@
           <a:p>
             <a:fld id="{6CBBC5D8-5190-7F47-8A60-C64E9CB85285}" type="datetimeFigureOut">
               <a:rPr lang="en-US" smtClean="0"/>
-              <a:t>10/22/19</a:t>
+              <a:t>10/24/2019</a:t>
             </a:fld>
             <a:endParaRPr lang="en-US"/>
           </a:p>
@@ -866,7 +871,7 @@
           <a:p>
             <a:fld id="{6CBBC5D8-5190-7F47-8A60-C64E9CB85285}" type="datetimeFigureOut">
               <a:rPr lang="en-US" smtClean="0"/>
-              <a:t>10/22/19</a:t>
+              <a:t>10/24/2019</a:t>
             </a:fld>
             <a:endParaRPr lang="en-US"/>
           </a:p>
@@ -1142,7 +1147,7 @@
           <a:p>
             <a:fld id="{6CBBC5D8-5190-7F47-8A60-C64E9CB85285}" type="datetimeFigureOut">
               <a:rPr lang="en-US" smtClean="0"/>
-              <a:t>10/22/19</a:t>
+              <a:t>10/24/2019</a:t>
             </a:fld>
             <a:endParaRPr lang="en-US"/>
           </a:p>
@@ -1410,7 +1415,7 @@
           <a:p>
             <a:fld id="{6CBBC5D8-5190-7F47-8A60-C64E9CB85285}" type="datetimeFigureOut">
               <a:rPr lang="en-US" smtClean="0"/>
-              <a:t>10/22/19</a:t>
+              <a:t>10/24/2019</a:t>
             </a:fld>
             <a:endParaRPr lang="en-US"/>
           </a:p>
@@ -1825,7 +1830,7 @@
           <a:p>
             <a:fld id="{6CBBC5D8-5190-7F47-8A60-C64E9CB85285}" type="datetimeFigureOut">
               <a:rPr lang="en-US" smtClean="0"/>
-              <a:t>10/22/19</a:t>
+              <a:t>10/24/2019</a:t>
             </a:fld>
             <a:endParaRPr lang="en-US"/>
           </a:p>
@@ -1967,7 +1972,7 @@
           <a:p>
             <a:fld id="{6CBBC5D8-5190-7F47-8A60-C64E9CB85285}" type="datetimeFigureOut">
               <a:rPr lang="en-US" smtClean="0"/>
-              <a:t>10/22/19</a:t>
+              <a:t>10/24/2019</a:t>
             </a:fld>
             <a:endParaRPr lang="en-US"/>
           </a:p>
@@ -2080,7 +2085,7 @@
           <a:p>
             <a:fld id="{6CBBC5D8-5190-7F47-8A60-C64E9CB85285}" type="datetimeFigureOut">
               <a:rPr lang="en-US" smtClean="0"/>
-              <a:t>10/22/19</a:t>
+              <a:t>10/24/2019</a:t>
             </a:fld>
             <a:endParaRPr lang="en-US"/>
           </a:p>
@@ -2393,7 +2398,7 @@
           <a:p>
             <a:fld id="{6CBBC5D8-5190-7F47-8A60-C64E9CB85285}" type="datetimeFigureOut">
               <a:rPr lang="en-US" smtClean="0"/>
-              <a:t>10/22/19</a:t>
+              <a:t>10/24/2019</a:t>
             </a:fld>
             <a:endParaRPr lang="en-US"/>
           </a:p>
@@ -2682,7 +2687,7 @@
           <a:p>
             <a:fld id="{6CBBC5D8-5190-7F47-8A60-C64E9CB85285}" type="datetimeFigureOut">
               <a:rPr lang="en-US" smtClean="0"/>
-              <a:t>10/22/19</a:t>
+              <a:t>10/24/2019</a:t>
             </a:fld>
             <a:endParaRPr lang="en-US"/>
           </a:p>
@@ -2925,7 +2930,7 @@
           <a:p>
             <a:fld id="{6CBBC5D8-5190-7F47-8A60-C64E9CB85285}" type="datetimeFigureOut">
               <a:rPr lang="en-US" smtClean="0"/>
-              <a:t>10/22/19</a:t>
+              <a:t>10/24/2019</a:t>
             </a:fld>
             <a:endParaRPr lang="en-US"/>
           </a:p>

</xml_diff>

<commit_message>
Fix sequence diagrams and change all colors to be more obvious in Developer Guide based on comments and error from Jin Yao.
</commit_message>
<xml_diff>
--- a/docs/diagrams/AddSavingCommand.pptx
+++ b/docs/diagrams/AddSavingCommand.pptx
@@ -261,7 +261,7 @@
           <a:p>
             <a:fld id="{6CBBC5D8-5190-7F47-8A60-C64E9CB85285}" type="datetimeFigureOut">
               <a:rPr lang="en-US" smtClean="0"/>
-              <a:t>10/24/2019</a:t>
+              <a:t>10/31/19</a:t>
             </a:fld>
             <a:endParaRPr lang="en-US"/>
           </a:p>
@@ -461,7 +461,7 @@
           <a:p>
             <a:fld id="{6CBBC5D8-5190-7F47-8A60-C64E9CB85285}" type="datetimeFigureOut">
               <a:rPr lang="en-US" smtClean="0"/>
-              <a:t>10/24/2019</a:t>
+              <a:t>10/31/19</a:t>
             </a:fld>
             <a:endParaRPr lang="en-US"/>
           </a:p>
@@ -671,7 +671,7 @@
           <a:p>
             <a:fld id="{6CBBC5D8-5190-7F47-8A60-C64E9CB85285}" type="datetimeFigureOut">
               <a:rPr lang="en-US" smtClean="0"/>
-              <a:t>10/24/2019</a:t>
+              <a:t>10/31/19</a:t>
             </a:fld>
             <a:endParaRPr lang="en-US"/>
           </a:p>
@@ -871,7 +871,7 @@
           <a:p>
             <a:fld id="{6CBBC5D8-5190-7F47-8A60-C64E9CB85285}" type="datetimeFigureOut">
               <a:rPr lang="en-US" smtClean="0"/>
-              <a:t>10/24/2019</a:t>
+              <a:t>10/31/19</a:t>
             </a:fld>
             <a:endParaRPr lang="en-US"/>
           </a:p>
@@ -1147,7 +1147,7 @@
           <a:p>
             <a:fld id="{6CBBC5D8-5190-7F47-8A60-C64E9CB85285}" type="datetimeFigureOut">
               <a:rPr lang="en-US" smtClean="0"/>
-              <a:t>10/24/2019</a:t>
+              <a:t>10/31/19</a:t>
             </a:fld>
             <a:endParaRPr lang="en-US"/>
           </a:p>
@@ -1415,7 +1415,7 @@
           <a:p>
             <a:fld id="{6CBBC5D8-5190-7F47-8A60-C64E9CB85285}" type="datetimeFigureOut">
               <a:rPr lang="en-US" smtClean="0"/>
-              <a:t>10/24/2019</a:t>
+              <a:t>10/31/19</a:t>
             </a:fld>
             <a:endParaRPr lang="en-US"/>
           </a:p>
@@ -1830,7 +1830,7 @@
           <a:p>
             <a:fld id="{6CBBC5D8-5190-7F47-8A60-C64E9CB85285}" type="datetimeFigureOut">
               <a:rPr lang="en-US" smtClean="0"/>
-              <a:t>10/24/2019</a:t>
+              <a:t>10/31/19</a:t>
             </a:fld>
             <a:endParaRPr lang="en-US"/>
           </a:p>
@@ -1972,7 +1972,7 @@
           <a:p>
             <a:fld id="{6CBBC5D8-5190-7F47-8A60-C64E9CB85285}" type="datetimeFigureOut">
               <a:rPr lang="en-US" smtClean="0"/>
-              <a:t>10/24/2019</a:t>
+              <a:t>10/31/19</a:t>
             </a:fld>
             <a:endParaRPr lang="en-US"/>
           </a:p>
@@ -2085,7 +2085,7 @@
           <a:p>
             <a:fld id="{6CBBC5D8-5190-7F47-8A60-C64E9CB85285}" type="datetimeFigureOut">
               <a:rPr lang="en-US" smtClean="0"/>
-              <a:t>10/24/2019</a:t>
+              <a:t>10/31/19</a:t>
             </a:fld>
             <a:endParaRPr lang="en-US"/>
           </a:p>
@@ -2398,7 +2398,7 @@
           <a:p>
             <a:fld id="{6CBBC5D8-5190-7F47-8A60-C64E9CB85285}" type="datetimeFigureOut">
               <a:rPr lang="en-US" smtClean="0"/>
-              <a:t>10/24/2019</a:t>
+              <a:t>10/31/19</a:t>
             </a:fld>
             <a:endParaRPr lang="en-US"/>
           </a:p>
@@ -2687,7 +2687,7 @@
           <a:p>
             <a:fld id="{6CBBC5D8-5190-7F47-8A60-C64E9CB85285}" type="datetimeFigureOut">
               <a:rPr lang="en-US" smtClean="0"/>
-              <a:t>10/24/2019</a:t>
+              <a:t>10/31/19</a:t>
             </a:fld>
             <a:endParaRPr lang="en-US"/>
           </a:p>
@@ -2930,7 +2930,7 @@
           <a:p>
             <a:fld id="{6CBBC5D8-5190-7F47-8A60-C64E9CB85285}" type="datetimeFigureOut">
               <a:rPr lang="en-US" smtClean="0"/>
-              <a:t>10/24/2019</a:t>
+              <a:t>10/31/19</a:t>
             </a:fld>
             <a:endParaRPr lang="en-US"/>
           </a:p>
@@ -3349,10 +3349,10 @@
       </p:grpSpPr>
       <p:grpSp>
         <p:nvGrpSpPr>
-          <p:cNvPr id="62" name="Group 61">
+          <p:cNvPr id="58" name="Group 57">
             <a:extLst>
               <a:ext uri="{FF2B5EF4-FFF2-40B4-BE49-F238E27FC236}">
-                <a16:creationId xmlns:a16="http://schemas.microsoft.com/office/drawing/2014/main" id="{30A869B4-E555-1B47-848E-A2F5C3739AEE}"/>
+                <a16:creationId xmlns:a16="http://schemas.microsoft.com/office/drawing/2014/main" id="{317B2411-DCDC-3D41-84C7-F0F00B32BF41}"/>
               </a:ext>
             </a:extLst>
           </p:cNvPr>
@@ -3361,18 +3361,18 @@
         </p:nvGrpSpPr>
         <p:grpSpPr>
           <a:xfrm>
-            <a:off x="99745" y="164216"/>
-            <a:ext cx="11992509" cy="6529567"/>
-            <a:chOff x="128735" y="157511"/>
-            <a:chExt cx="11992509" cy="6529567"/>
+            <a:off x="128735" y="205612"/>
+            <a:ext cx="11992509" cy="6551805"/>
+            <a:chOff x="128735" y="135273"/>
+            <a:chExt cx="11992509" cy="6551805"/>
           </a:xfrm>
         </p:grpSpPr>
         <p:cxnSp>
           <p:nvCxnSpPr>
-            <p:cNvPr id="63" name="Curved Connector 62">
+            <p:cNvPr id="59" name="Curved Connector 58">
               <a:extLst>
                 <a:ext uri="{FF2B5EF4-FFF2-40B4-BE49-F238E27FC236}">
-                  <a16:creationId xmlns:a16="http://schemas.microsoft.com/office/drawing/2014/main" id="{37224720-972B-A747-A405-EEE8664872E6}"/>
+                  <a16:creationId xmlns:a16="http://schemas.microsoft.com/office/drawing/2014/main" id="{85D57338-5FF7-804A-A893-03E17EFF62AE}"/>
                 </a:ext>
               </a:extLst>
             </p:cNvPr>
@@ -3395,8 +3395,7 @@
             <a:ln>
               <a:solidFill>
                 <a:schemeClr val="accent1">
-                  <a:lumMod val="20000"/>
-                  <a:lumOff val="80000"/>
+                  <a:lumMod val="75000"/>
                 </a:schemeClr>
               </a:solidFill>
               <a:tailEnd type="triangle"/>
@@ -3419,16 +3418,16 @@
         </p:cxnSp>
         <p:cxnSp>
           <p:nvCxnSpPr>
-            <p:cNvPr id="64" name="Straight Arrow Connector 63">
+            <p:cNvPr id="60" name="Straight Arrow Connector 59">
               <a:extLst>
                 <a:ext uri="{FF2B5EF4-FFF2-40B4-BE49-F238E27FC236}">
-                  <a16:creationId xmlns:a16="http://schemas.microsoft.com/office/drawing/2014/main" id="{15F7C99B-EE0C-2642-8283-77549113386A}"/>
+                  <a16:creationId xmlns:a16="http://schemas.microsoft.com/office/drawing/2014/main" id="{4CBCC3B5-9A0C-0543-8A2B-F5B1CDF9FF1B}"/>
                 </a:ext>
               </a:extLst>
             </p:cNvPr>
             <p:cNvCxnSpPr>
               <a:cxnSpLocks/>
-              <a:stCxn id="99" idx="3"/>
+              <a:stCxn id="151" idx="3"/>
             </p:cNvCxnSpPr>
             <p:nvPr/>
           </p:nvCxnSpPr>
@@ -3442,9 +3441,8 @@
             </a:prstGeom>
             <a:ln>
               <a:solidFill>
-                <a:schemeClr val="tx2">
-                  <a:lumMod val="20000"/>
-                  <a:lumOff val="80000"/>
+                <a:schemeClr val="accent1">
+                  <a:lumMod val="75000"/>
                 </a:schemeClr>
               </a:solidFill>
               <a:tailEnd type="triangle"/>
@@ -3467,10 +3465,10 @@
         </p:cxnSp>
         <p:cxnSp>
           <p:nvCxnSpPr>
-            <p:cNvPr id="65" name="Straight Arrow Connector 64">
+            <p:cNvPr id="61" name="Straight Arrow Connector 60">
               <a:extLst>
                 <a:ext uri="{FF2B5EF4-FFF2-40B4-BE49-F238E27FC236}">
-                  <a16:creationId xmlns:a16="http://schemas.microsoft.com/office/drawing/2014/main" id="{B436E9D0-6FF9-C742-BFE9-4D1512B57566}"/>
+                  <a16:creationId xmlns:a16="http://schemas.microsoft.com/office/drawing/2014/main" id="{D054607A-81AA-C349-90AF-4A95A436152E}"/>
                 </a:ext>
               </a:extLst>
             </p:cNvPr>
@@ -3490,8 +3488,7 @@
             <a:ln>
               <a:solidFill>
                 <a:schemeClr val="accent1">
-                  <a:lumMod val="20000"/>
-                  <a:lumOff val="80000"/>
+                  <a:lumMod val="75000"/>
                 </a:schemeClr>
               </a:solidFill>
               <a:tailEnd type="triangle"/>
@@ -3514,16 +3511,16 @@
         </p:cxnSp>
         <p:cxnSp>
           <p:nvCxnSpPr>
-            <p:cNvPr id="66" name="Straight Arrow Connector 65">
+            <p:cNvPr id="118" name="Straight Arrow Connector 117">
               <a:extLst>
                 <a:ext uri="{FF2B5EF4-FFF2-40B4-BE49-F238E27FC236}">
-                  <a16:creationId xmlns:a16="http://schemas.microsoft.com/office/drawing/2014/main" id="{C9F72C20-28A0-7143-A167-01F131E3A9D0}"/>
+                  <a16:creationId xmlns:a16="http://schemas.microsoft.com/office/drawing/2014/main" id="{D416A2CB-31DF-2B42-84F5-F4E06B933EBF}"/>
                 </a:ext>
               </a:extLst>
             </p:cNvPr>
             <p:cNvCxnSpPr>
               <a:cxnSpLocks/>
-              <a:stCxn id="97" idx="2"/>
+              <a:stCxn id="149" idx="2"/>
             </p:cNvCxnSpPr>
             <p:nvPr/>
           </p:nvCxnSpPr>
@@ -3538,8 +3535,7 @@
             <a:ln>
               <a:solidFill>
                 <a:schemeClr val="accent1">
-                  <a:lumMod val="20000"/>
-                  <a:lumOff val="80000"/>
+                  <a:lumMod val="75000"/>
                 </a:schemeClr>
               </a:solidFill>
               <a:prstDash val="sysDash"/>
@@ -3563,10 +3559,10 @@
         </p:cxnSp>
         <p:cxnSp>
           <p:nvCxnSpPr>
-            <p:cNvPr id="67" name="Curved Connector 66">
+            <p:cNvPr id="119" name="Curved Connector 118">
               <a:extLst>
                 <a:ext uri="{FF2B5EF4-FFF2-40B4-BE49-F238E27FC236}">
-                  <a16:creationId xmlns:a16="http://schemas.microsoft.com/office/drawing/2014/main" id="{D6BDDA80-1DD6-314B-BFA4-4E5DD5C6AEFB}"/>
+                  <a16:creationId xmlns:a16="http://schemas.microsoft.com/office/drawing/2014/main" id="{A73DB3B9-D5BC-6C4C-8104-1DCF372C2A5B}"/>
                 </a:ext>
               </a:extLst>
             </p:cNvPr>
@@ -3576,21 +3572,19 @@
             <p:nvPr/>
           </p:nvCxnSpPr>
           <p:spPr>
-            <a:xfrm rot="16200000" flipH="1">
-              <a:off x="8583275" y="1702403"/>
-              <a:ext cx="144865" cy="193058"/>
+            <a:xfrm>
+              <a:off x="8569113" y="1726096"/>
+              <a:ext cx="187191" cy="162087"/>
             </a:xfrm>
-            <a:prstGeom prst="curvedConnector4">
+            <a:prstGeom prst="curvedConnector3">
               <a:avLst>
-                <a:gd name="adj1" fmla="val 30058"/>
-                <a:gd name="adj2" fmla="val 152845"/>
+                <a:gd name="adj1" fmla="val 134297"/>
               </a:avLst>
             </a:prstGeom>
             <a:ln>
               <a:solidFill>
                 <a:schemeClr val="accent1">
-                  <a:lumMod val="20000"/>
-                  <a:lumOff val="80000"/>
+                  <a:lumMod val="75000"/>
                 </a:schemeClr>
               </a:solidFill>
               <a:tailEnd type="triangle"/>
@@ -3613,10 +3607,10 @@
         </p:cxnSp>
         <p:sp>
           <p:nvSpPr>
-            <p:cNvPr id="68" name="Rectangle 67">
+            <p:cNvPr id="120" name="Rectangle 119">
               <a:extLst>
                 <a:ext uri="{FF2B5EF4-FFF2-40B4-BE49-F238E27FC236}">
-                  <a16:creationId xmlns:a16="http://schemas.microsoft.com/office/drawing/2014/main" id="{6E8439AD-1DEE-DC49-985E-41619A402E05}"/>
+                  <a16:creationId xmlns:a16="http://schemas.microsoft.com/office/drawing/2014/main" id="{B97DC6A7-EF2F-FA4F-B751-0356DC691DA3}"/>
                 </a:ext>
               </a:extLst>
             </p:cNvPr>
@@ -3625,8 +3619,8 @@
           </p:nvSpPr>
           <p:spPr>
             <a:xfrm>
-              <a:off x="447828" y="405933"/>
-              <a:ext cx="128734" cy="6208827"/>
+              <a:off x="447827" y="622286"/>
+              <a:ext cx="135305" cy="5992474"/>
             </a:xfrm>
             <a:prstGeom prst="rect">
               <a:avLst/>
@@ -3634,8 +3628,8 @@
             <a:noFill/>
             <a:ln>
               <a:solidFill>
-                <a:schemeClr val="bg2">
-                  <a:lumMod val="90000"/>
+                <a:schemeClr val="bg1">
+                  <a:lumMod val="50000"/>
                 </a:schemeClr>
               </a:solidFill>
             </a:ln>
@@ -3670,10 +3664,10 @@
         </p:sp>
         <p:sp>
           <p:nvSpPr>
-            <p:cNvPr id="69" name="TextBox 68">
+            <p:cNvPr id="121" name="TextBox 120">
               <a:extLst>
                 <a:ext uri="{FF2B5EF4-FFF2-40B4-BE49-F238E27FC236}">
-                  <a16:creationId xmlns:a16="http://schemas.microsoft.com/office/drawing/2014/main" id="{E0D829DF-F8BC-CB41-9C27-D5737F7D8FA0}"/>
+                  <a16:creationId xmlns:a16="http://schemas.microsoft.com/office/drawing/2014/main" id="{2AE9196B-72DC-6B4A-8AFD-61B4B9394367}"/>
                 </a:ext>
               </a:extLst>
             </p:cNvPr>
@@ -3682,7 +3676,7 @@
           </p:nvSpPr>
           <p:spPr>
             <a:xfrm>
-              <a:off x="178933" y="157511"/>
+              <a:off x="153716" y="145846"/>
               <a:ext cx="723528" cy="261610"/>
             </a:xfrm>
             <a:prstGeom prst="rect">
@@ -3693,6 +3687,13 @@
                 <a:lumMod val="90000"/>
               </a:schemeClr>
             </a:solidFill>
+            <a:ln>
+              <a:solidFill>
+                <a:schemeClr val="bg1">
+                  <a:lumMod val="50000"/>
+                </a:schemeClr>
+              </a:solidFill>
+            </a:ln>
           </p:spPr>
           <p:txBody>
             <a:bodyPr wrap="square" rtlCol="0" anchor="ctr">
@@ -3702,7 +3703,7 @@
             <a:p>
               <a:pPr algn="ctr"/>
               <a:r>
-                <a:rPr lang="en-US" sz="1100">
+                <a:rPr lang="en-US" sz="1100" dirty="0">
                   <a:latin typeface="Arial" panose="020B0604020202020204" pitchFamily="34" charset="0"/>
                   <a:cs typeface="Arial" panose="020B0604020202020204" pitchFamily="34" charset="0"/>
                 </a:rPr>
@@ -3713,10 +3714,10 @@
         </p:sp>
         <p:cxnSp>
           <p:nvCxnSpPr>
-            <p:cNvPr id="70" name="Straight Arrow Connector 69">
+            <p:cNvPr id="122" name="Straight Arrow Connector 121">
               <a:extLst>
                 <a:ext uri="{FF2B5EF4-FFF2-40B4-BE49-F238E27FC236}">
-                  <a16:creationId xmlns:a16="http://schemas.microsoft.com/office/drawing/2014/main" id="{C1DD8C84-5FCA-2C4D-A0D0-F1DB2FA9ECD3}"/>
+                  <a16:creationId xmlns:a16="http://schemas.microsoft.com/office/drawing/2014/main" id="{7B55A4F4-37C1-354C-A3A5-6055C6A01381}"/>
                 </a:ext>
               </a:extLst>
             </p:cNvPr>
@@ -3735,8 +3736,8 @@
             </a:prstGeom>
             <a:ln>
               <a:solidFill>
-                <a:schemeClr val="bg2">
-                  <a:lumMod val="90000"/>
+                <a:schemeClr val="bg1">
+                  <a:lumMod val="50000"/>
                 </a:schemeClr>
               </a:solidFill>
               <a:tailEnd type="triangle"/>
@@ -3759,10 +3760,10 @@
         </p:cxnSp>
         <p:sp>
           <p:nvSpPr>
-            <p:cNvPr id="71" name="Rectangle 70">
+            <p:cNvPr id="123" name="Rectangle 122">
               <a:extLst>
                 <a:ext uri="{FF2B5EF4-FFF2-40B4-BE49-F238E27FC236}">
-                  <a16:creationId xmlns:a16="http://schemas.microsoft.com/office/drawing/2014/main" id="{C0F543A7-94B4-E64A-B5D8-F45D7CA26D5B}"/>
+                  <a16:creationId xmlns:a16="http://schemas.microsoft.com/office/drawing/2014/main" id="{BBD24040-9635-B345-9B38-EDB90FB00AC6}"/>
                 </a:ext>
               </a:extLst>
             </p:cNvPr>
@@ -3780,10 +3781,7 @@
             <a:noFill/>
             <a:ln>
               <a:solidFill>
-                <a:schemeClr val="tx2">
-                  <a:lumMod val="40000"/>
-                  <a:lumOff val="60000"/>
-                </a:schemeClr>
+                <a:schemeClr val="tx2"/>
               </a:solidFill>
             </a:ln>
           </p:spPr>
@@ -3817,10 +3815,10 @@
         </p:sp>
         <p:sp>
           <p:nvSpPr>
-            <p:cNvPr id="72" name="TextBox 71">
+            <p:cNvPr id="124" name="TextBox 123">
               <a:extLst>
                 <a:ext uri="{FF2B5EF4-FFF2-40B4-BE49-F238E27FC236}">
-                  <a16:creationId xmlns:a16="http://schemas.microsoft.com/office/drawing/2014/main" id="{83B2D73F-3EB9-2848-8A63-131D50FB88DC}"/>
+                  <a16:creationId xmlns:a16="http://schemas.microsoft.com/office/drawing/2014/main" id="{4C95B9F1-6380-6442-A858-A7075665C2A6}"/>
                 </a:ext>
               </a:extLst>
             </p:cNvPr>
@@ -3829,7 +3827,7 @@
           </p:nvSpPr>
           <p:spPr>
             <a:xfrm>
-              <a:off x="1696231" y="157511"/>
+              <a:off x="1696231" y="135273"/>
               <a:ext cx="1507926" cy="261610"/>
             </a:xfrm>
             <a:prstGeom prst="rect">
@@ -3841,6 +3839,11 @@
                 <a:lumOff val="40000"/>
               </a:schemeClr>
             </a:solidFill>
+            <a:ln>
+              <a:solidFill>
+                <a:schemeClr val="tx2"/>
+              </a:solidFill>
+            </a:ln>
           </p:spPr>
           <p:txBody>
             <a:bodyPr wrap="square" rtlCol="0" anchor="ctr">
@@ -3850,7 +3853,7 @@
             <a:p>
               <a:pPr algn="ctr"/>
               <a:r>
-                <a:rPr lang="en-US" sz="1100">
+                <a:rPr lang="en-US" sz="1100" dirty="0">
                   <a:latin typeface="Arial" panose="020B0604020202020204" pitchFamily="34" charset="0"/>
                   <a:cs typeface="Arial" panose="020B0604020202020204" pitchFamily="34" charset="0"/>
                 </a:rPr>
@@ -3861,34 +3864,31 @@
         </p:sp>
         <p:cxnSp>
           <p:nvCxnSpPr>
-            <p:cNvPr id="73" name="Straight Connector 72">
+            <p:cNvPr id="125" name="Straight Connector 124">
               <a:extLst>
                 <a:ext uri="{FF2B5EF4-FFF2-40B4-BE49-F238E27FC236}">
-                  <a16:creationId xmlns:a16="http://schemas.microsoft.com/office/drawing/2014/main" id="{37821270-EED8-D844-85EC-1A969D7BBC4A}"/>
+                  <a16:creationId xmlns:a16="http://schemas.microsoft.com/office/drawing/2014/main" id="{5A29CDAD-0401-0A46-8F7A-52DCA7132C42}"/>
                 </a:ext>
               </a:extLst>
             </p:cNvPr>
             <p:cNvCxnSpPr>
               <a:cxnSpLocks/>
-              <a:stCxn id="72" idx="2"/>
-              <a:endCxn id="71" idx="0"/>
+              <a:stCxn id="124" idx="2"/>
+              <a:endCxn id="123" idx="0"/>
             </p:cNvCxnSpPr>
             <p:nvPr/>
           </p:nvCxnSpPr>
           <p:spPr>
             <a:xfrm>
-              <a:off x="2450194" y="419121"/>
-              <a:ext cx="0" cy="272859"/>
+              <a:off x="2450194" y="396883"/>
+              <a:ext cx="0" cy="295097"/>
             </a:xfrm>
             <a:prstGeom prst="line">
               <a:avLst/>
             </a:prstGeom>
             <a:ln>
               <a:solidFill>
-                <a:schemeClr val="tx2">
-                  <a:lumMod val="40000"/>
-                  <a:lumOff val="60000"/>
-                </a:schemeClr>
+                <a:schemeClr val="tx2"/>
               </a:solidFill>
               <a:prstDash val="sysDash"/>
             </a:ln>
@@ -3910,10 +3910,10 @@
         </p:cxnSp>
         <p:sp>
           <p:nvSpPr>
-            <p:cNvPr id="74" name="TextBox 73">
+            <p:cNvPr id="126" name="TextBox 125">
               <a:extLst>
                 <a:ext uri="{FF2B5EF4-FFF2-40B4-BE49-F238E27FC236}">
-                  <a16:creationId xmlns:a16="http://schemas.microsoft.com/office/drawing/2014/main" id="{65F6AD4A-D465-804E-8555-5456F169B5E5}"/>
+                  <a16:creationId xmlns:a16="http://schemas.microsoft.com/office/drawing/2014/main" id="{872479E3-ABAB-1946-8EAF-4627DBF3A33B}"/>
                 </a:ext>
               </a:extLst>
             </p:cNvPr>
@@ -3948,10 +3948,10 @@
         </p:sp>
         <p:sp>
           <p:nvSpPr>
-            <p:cNvPr id="75" name="Rectangle 74">
+            <p:cNvPr id="127" name="Rectangle 126">
               <a:extLst>
                 <a:ext uri="{FF2B5EF4-FFF2-40B4-BE49-F238E27FC236}">
-                  <a16:creationId xmlns:a16="http://schemas.microsoft.com/office/drawing/2014/main" id="{4D8CD943-E56C-B84E-A398-4B82A9E4B9D7}"/>
+                  <a16:creationId xmlns:a16="http://schemas.microsoft.com/office/drawing/2014/main" id="{5C218B94-1224-5F46-8A9F-3D9D7C1C0858}"/>
                 </a:ext>
               </a:extLst>
             </p:cNvPr>
@@ -4006,10 +4006,10 @@
         </p:sp>
         <p:sp>
           <p:nvSpPr>
-            <p:cNvPr id="76" name="TextBox 75">
+            <p:cNvPr id="128" name="TextBox 127">
               <a:extLst>
                 <a:ext uri="{FF2B5EF4-FFF2-40B4-BE49-F238E27FC236}">
-                  <a16:creationId xmlns:a16="http://schemas.microsoft.com/office/drawing/2014/main" id="{FCA4CE3C-EFF3-3B44-B559-5CED8B6AC11B}"/>
+                  <a16:creationId xmlns:a16="http://schemas.microsoft.com/office/drawing/2014/main" id="{801FDE25-9B35-DF40-BF9F-70DA83D6BC3C}"/>
                 </a:ext>
               </a:extLst>
             </p:cNvPr>
@@ -4050,16 +4050,16 @@
         </p:sp>
         <p:cxnSp>
           <p:nvCxnSpPr>
-            <p:cNvPr id="77" name="Straight Arrow Connector 76">
+            <p:cNvPr id="129" name="Straight Arrow Connector 128">
               <a:extLst>
                 <a:ext uri="{FF2B5EF4-FFF2-40B4-BE49-F238E27FC236}">
-                  <a16:creationId xmlns:a16="http://schemas.microsoft.com/office/drawing/2014/main" id="{896DFC75-1A8D-574C-B8D2-C2CBAE0E1E88}"/>
+                  <a16:creationId xmlns:a16="http://schemas.microsoft.com/office/drawing/2014/main" id="{DBF146EA-B39B-BF40-908A-52A459A651D4}"/>
                 </a:ext>
               </a:extLst>
             </p:cNvPr>
             <p:cNvCxnSpPr>
               <a:cxnSpLocks/>
-              <a:endCxn id="76" idx="1"/>
+              <a:endCxn id="128" idx="1"/>
             </p:cNvCxnSpPr>
             <p:nvPr/>
           </p:nvCxnSpPr>
@@ -4073,10 +4073,7 @@
             </a:prstGeom>
             <a:ln>
               <a:solidFill>
-                <a:schemeClr val="tx2">
-                  <a:lumMod val="40000"/>
-                  <a:lumOff val="60000"/>
-                </a:schemeClr>
+                <a:schemeClr val="tx2"/>
               </a:solidFill>
               <a:tailEnd type="triangle"/>
             </a:ln>
@@ -4098,10 +4095,10 @@
         </p:cxnSp>
         <p:sp>
           <p:nvSpPr>
-            <p:cNvPr id="78" name="TextBox 77">
+            <p:cNvPr id="130" name="TextBox 129">
               <a:extLst>
                 <a:ext uri="{FF2B5EF4-FFF2-40B4-BE49-F238E27FC236}">
-                  <a16:creationId xmlns:a16="http://schemas.microsoft.com/office/drawing/2014/main" id="{90A7BF2D-CB60-6E4F-9A03-4A7FBADF6A09}"/>
+                  <a16:creationId xmlns:a16="http://schemas.microsoft.com/office/drawing/2014/main" id="{4D5B6434-C30A-B245-B56C-F67252E8DC52}"/>
                 </a:ext>
               </a:extLst>
             </p:cNvPr>
@@ -4136,15 +4133,15 @@
         </p:sp>
         <p:cxnSp>
           <p:nvCxnSpPr>
-            <p:cNvPr id="79" name="Straight Arrow Connector 78">
+            <p:cNvPr id="131" name="Straight Arrow Connector 130">
               <a:extLst>
                 <a:ext uri="{FF2B5EF4-FFF2-40B4-BE49-F238E27FC236}">
-                  <a16:creationId xmlns:a16="http://schemas.microsoft.com/office/drawing/2014/main" id="{0E2C5A8A-E623-9048-9FE8-D1734977BF55}"/>
+                  <a16:creationId xmlns:a16="http://schemas.microsoft.com/office/drawing/2014/main" id="{A54CC173-C493-6346-83C7-D62015B31F89}"/>
                 </a:ext>
               </a:extLst>
             </p:cNvPr>
             <p:cNvCxnSpPr>
-              <a:stCxn id="75" idx="2"/>
+              <a:stCxn id="127" idx="2"/>
             </p:cNvCxnSpPr>
             <p:nvPr/>
           </p:nvCxnSpPr>
@@ -4158,10 +4155,7 @@
             </a:prstGeom>
             <a:ln>
               <a:solidFill>
-                <a:schemeClr val="tx2">
-                  <a:lumMod val="40000"/>
-                  <a:lumOff val="60000"/>
-                </a:schemeClr>
+                <a:schemeClr val="tx2"/>
               </a:solidFill>
               <a:prstDash val="sysDash"/>
               <a:tailEnd type="triangle"/>
@@ -4184,10 +4178,10 @@
         </p:cxnSp>
         <p:sp>
           <p:nvSpPr>
-            <p:cNvPr id="80" name="TextBox 79">
+            <p:cNvPr id="132" name="TextBox 131">
               <a:extLst>
                 <a:ext uri="{FF2B5EF4-FFF2-40B4-BE49-F238E27FC236}">
-                  <a16:creationId xmlns:a16="http://schemas.microsoft.com/office/drawing/2014/main" id="{20E8C057-AA9D-664A-8AB9-6EB59F0CD672}"/>
+                  <a16:creationId xmlns:a16="http://schemas.microsoft.com/office/drawing/2014/main" id="{67DD45A3-57BD-7A45-B177-862788908DAA}"/>
                 </a:ext>
               </a:extLst>
             </p:cNvPr>
@@ -4222,10 +4216,10 @@
         </p:sp>
         <p:sp>
           <p:nvSpPr>
-            <p:cNvPr id="81" name="TextBox 80">
+            <p:cNvPr id="133" name="TextBox 132">
               <a:extLst>
                 <a:ext uri="{FF2B5EF4-FFF2-40B4-BE49-F238E27FC236}">
-                  <a16:creationId xmlns:a16="http://schemas.microsoft.com/office/drawing/2014/main" id="{AF7A200E-448B-B741-8769-1C97B69CBF31}"/>
+                  <a16:creationId xmlns:a16="http://schemas.microsoft.com/office/drawing/2014/main" id="{62A82C83-20CC-934A-9CB4-4F81D9E1F1C4}"/>
                 </a:ext>
               </a:extLst>
             </p:cNvPr>
@@ -4263,17 +4257,17 @@
         </p:sp>
         <p:cxnSp>
           <p:nvCxnSpPr>
-            <p:cNvPr id="82" name="Straight Connector 81">
+            <p:cNvPr id="134" name="Straight Connector 133">
               <a:extLst>
                 <a:ext uri="{FF2B5EF4-FFF2-40B4-BE49-F238E27FC236}">
-                  <a16:creationId xmlns:a16="http://schemas.microsoft.com/office/drawing/2014/main" id="{47DAD43C-F646-C74C-B8F0-45D055053477}"/>
+                  <a16:creationId xmlns:a16="http://schemas.microsoft.com/office/drawing/2014/main" id="{408A8E23-C47B-B745-950B-B5F2C17ED48C}"/>
                 </a:ext>
               </a:extLst>
             </p:cNvPr>
             <p:cNvCxnSpPr>
               <a:cxnSpLocks/>
-              <a:stCxn id="81" idx="2"/>
-              <a:endCxn id="83" idx="0"/>
+              <a:stCxn id="133" idx="2"/>
+              <a:endCxn id="135" idx="0"/>
             </p:cNvCxnSpPr>
             <p:nvPr/>
           </p:nvCxnSpPr>
@@ -4309,10 +4303,10 @@
         </p:cxnSp>
         <p:sp>
           <p:nvSpPr>
-            <p:cNvPr id="83" name="Rectangle 82">
+            <p:cNvPr id="135" name="Rectangle 134">
               <a:extLst>
                 <a:ext uri="{FF2B5EF4-FFF2-40B4-BE49-F238E27FC236}">
-                  <a16:creationId xmlns:a16="http://schemas.microsoft.com/office/drawing/2014/main" id="{C57F185B-FD49-6148-A5C8-EDCFC2AA7D42}"/>
+                  <a16:creationId xmlns:a16="http://schemas.microsoft.com/office/drawing/2014/main" id="{DC5765E9-7A45-0849-B106-1DF230EF438A}"/>
                 </a:ext>
               </a:extLst>
             </p:cNvPr>
@@ -4364,10 +4358,10 @@
         </p:sp>
         <p:cxnSp>
           <p:nvCxnSpPr>
-            <p:cNvPr id="84" name="Straight Arrow Connector 83">
+            <p:cNvPr id="136" name="Straight Arrow Connector 135">
               <a:extLst>
                 <a:ext uri="{FF2B5EF4-FFF2-40B4-BE49-F238E27FC236}">
-                  <a16:creationId xmlns:a16="http://schemas.microsoft.com/office/drawing/2014/main" id="{32E93710-7BE2-3C4F-AECF-8D51392EF0EE}"/>
+                  <a16:creationId xmlns:a16="http://schemas.microsoft.com/office/drawing/2014/main" id="{DE7D94CF-2964-C341-8AA2-CB502B6E670D}"/>
                 </a:ext>
               </a:extLst>
             </p:cNvPr>
@@ -4386,10 +4380,7 @@
             </a:prstGeom>
             <a:ln>
               <a:solidFill>
-                <a:schemeClr val="tx2">
-                  <a:lumMod val="40000"/>
-                  <a:lumOff val="60000"/>
-                </a:schemeClr>
+                <a:schemeClr val="tx2"/>
               </a:solidFill>
               <a:tailEnd type="triangle"/>
             </a:ln>
@@ -4411,10 +4402,10 @@
         </p:cxnSp>
         <p:sp>
           <p:nvSpPr>
-            <p:cNvPr id="85" name="TextBox 84">
+            <p:cNvPr id="137" name="TextBox 136">
               <a:extLst>
                 <a:ext uri="{FF2B5EF4-FFF2-40B4-BE49-F238E27FC236}">
-                  <a16:creationId xmlns:a16="http://schemas.microsoft.com/office/drawing/2014/main" id="{A856AAD0-3B2B-7542-9B18-1C1671E7DE04}"/>
+                  <a16:creationId xmlns:a16="http://schemas.microsoft.com/office/drawing/2014/main" id="{86ED9385-908C-1441-A798-4C6202A94106}"/>
                 </a:ext>
               </a:extLst>
             </p:cNvPr>
@@ -4449,10 +4440,10 @@
         </p:sp>
         <p:sp>
           <p:nvSpPr>
-            <p:cNvPr id="86" name="TextBox 85">
+            <p:cNvPr id="138" name="TextBox 137">
               <a:extLst>
                 <a:ext uri="{FF2B5EF4-FFF2-40B4-BE49-F238E27FC236}">
-                  <a16:creationId xmlns:a16="http://schemas.microsoft.com/office/drawing/2014/main" id="{9EDC50BA-14C6-C747-897F-86437C47E6CC}"/>
+                  <a16:creationId xmlns:a16="http://schemas.microsoft.com/office/drawing/2014/main" id="{4487B032-F755-5442-A704-729164A53F03}"/>
                 </a:ext>
               </a:extLst>
             </p:cNvPr>
@@ -4473,6 +4464,13 @@
                 <a:lumOff val="80000"/>
               </a:schemeClr>
             </a:solidFill>
+            <a:ln>
+              <a:solidFill>
+                <a:schemeClr val="accent1">
+                  <a:lumMod val="75000"/>
+                </a:schemeClr>
+              </a:solidFill>
+            </a:ln>
           </p:spPr>
           <p:txBody>
             <a:bodyPr wrap="square" rtlCol="0" anchor="ctr">
@@ -4493,17 +4491,17 @@
         </p:sp>
         <p:cxnSp>
           <p:nvCxnSpPr>
-            <p:cNvPr id="87" name="Straight Connector 86">
+            <p:cNvPr id="139" name="Straight Connector 138">
               <a:extLst>
                 <a:ext uri="{FF2B5EF4-FFF2-40B4-BE49-F238E27FC236}">
-                  <a16:creationId xmlns:a16="http://schemas.microsoft.com/office/drawing/2014/main" id="{3BE63E3F-1C07-614C-8918-488D07D6A69A}"/>
+                  <a16:creationId xmlns:a16="http://schemas.microsoft.com/office/drawing/2014/main" id="{4F2C8900-D97A-A943-919B-1E1E8C89AA51}"/>
                 </a:ext>
               </a:extLst>
             </p:cNvPr>
             <p:cNvCxnSpPr>
               <a:cxnSpLocks/>
-              <a:stCxn id="86" idx="2"/>
-              <a:endCxn id="88" idx="0"/>
+              <a:stCxn id="138" idx="2"/>
+              <a:endCxn id="140" idx="0"/>
             </p:cNvCxnSpPr>
             <p:nvPr/>
           </p:nvCxnSpPr>
@@ -4518,8 +4516,7 @@
             <a:ln>
               <a:solidFill>
                 <a:schemeClr val="accent1">
-                  <a:lumMod val="40000"/>
-                  <a:lumOff val="60000"/>
+                  <a:lumMod val="75000"/>
                 </a:schemeClr>
               </a:solidFill>
               <a:prstDash val="sysDash"/>
@@ -4542,10 +4539,10 @@
         </p:cxnSp>
         <p:sp>
           <p:nvSpPr>
-            <p:cNvPr id="88" name="Rectangle 87">
+            <p:cNvPr id="140" name="Rectangle 139">
               <a:extLst>
                 <a:ext uri="{FF2B5EF4-FFF2-40B4-BE49-F238E27FC236}">
-                  <a16:creationId xmlns:a16="http://schemas.microsoft.com/office/drawing/2014/main" id="{E75878F7-F474-0E4B-B586-29DE7ED703B8}"/>
+                  <a16:creationId xmlns:a16="http://schemas.microsoft.com/office/drawing/2014/main" id="{453A5277-06AF-694B-9954-0F490168E4E7}"/>
                 </a:ext>
               </a:extLst>
             </p:cNvPr>
@@ -4566,8 +4563,7 @@
             <a:ln>
               <a:solidFill>
                 <a:schemeClr val="accent1">
-                  <a:lumMod val="20000"/>
-                  <a:lumOff val="80000"/>
+                  <a:lumMod val="75000"/>
                 </a:schemeClr>
               </a:solidFill>
             </a:ln>
@@ -4602,10 +4598,10 @@
         </p:sp>
         <p:cxnSp>
           <p:nvCxnSpPr>
-            <p:cNvPr id="89" name="Straight Arrow Connector 88">
+            <p:cNvPr id="141" name="Straight Arrow Connector 140">
               <a:extLst>
                 <a:ext uri="{FF2B5EF4-FFF2-40B4-BE49-F238E27FC236}">
-                  <a16:creationId xmlns:a16="http://schemas.microsoft.com/office/drawing/2014/main" id="{77D0997E-73F5-6146-8FF7-7CAB146C0B6D}"/>
+                  <a16:creationId xmlns:a16="http://schemas.microsoft.com/office/drawing/2014/main" id="{68F26C21-2D5E-304E-B3E3-FFF3A73C3378}"/>
                 </a:ext>
               </a:extLst>
             </p:cNvPr>
@@ -4646,10 +4642,10 @@
         </p:cxnSp>
         <p:sp>
           <p:nvSpPr>
-            <p:cNvPr id="90" name="TextBox 89">
+            <p:cNvPr id="142" name="TextBox 141">
               <a:extLst>
                 <a:ext uri="{FF2B5EF4-FFF2-40B4-BE49-F238E27FC236}">
-                  <a16:creationId xmlns:a16="http://schemas.microsoft.com/office/drawing/2014/main" id="{B1FD2991-ACA9-B84F-8C71-348B9904D39E}"/>
+                  <a16:creationId xmlns:a16="http://schemas.microsoft.com/office/drawing/2014/main" id="{A575EEC5-96F7-144B-ABDC-B737650B3295}"/>
                 </a:ext>
               </a:extLst>
             </p:cNvPr>
@@ -4684,16 +4680,16 @@
         </p:sp>
         <p:cxnSp>
           <p:nvCxnSpPr>
-            <p:cNvPr id="91" name="Straight Connector 90">
+            <p:cNvPr id="143" name="Straight Connector 142">
               <a:extLst>
                 <a:ext uri="{FF2B5EF4-FFF2-40B4-BE49-F238E27FC236}">
-                  <a16:creationId xmlns:a16="http://schemas.microsoft.com/office/drawing/2014/main" id="{F852A9EE-7C43-3940-9FF2-11C3E7C4F2EB}"/>
+                  <a16:creationId xmlns:a16="http://schemas.microsoft.com/office/drawing/2014/main" id="{C10E156F-6BDD-9645-BEF0-34A2C5541DF5}"/>
                 </a:ext>
               </a:extLst>
             </p:cNvPr>
             <p:cNvCxnSpPr>
               <a:cxnSpLocks/>
-              <a:stCxn id="92" idx="2"/>
+              <a:stCxn id="144" idx="2"/>
             </p:cNvCxnSpPr>
             <p:nvPr/>
           </p:nvCxnSpPr>
@@ -4708,8 +4704,7 @@
             <a:ln>
               <a:solidFill>
                 <a:schemeClr val="accent1">
-                  <a:lumMod val="20000"/>
-                  <a:lumOff val="80000"/>
+                  <a:lumMod val="75000"/>
                 </a:schemeClr>
               </a:solidFill>
               <a:prstDash val="sysDash"/>
@@ -4732,10 +4727,10 @@
         </p:cxnSp>
         <p:sp>
           <p:nvSpPr>
-            <p:cNvPr id="92" name="Rectangle 91">
+            <p:cNvPr id="144" name="Rectangle 143">
               <a:extLst>
                 <a:ext uri="{FF2B5EF4-FFF2-40B4-BE49-F238E27FC236}">
-                  <a16:creationId xmlns:a16="http://schemas.microsoft.com/office/drawing/2014/main" id="{B176BF4D-1885-E442-A120-231D6C6A994B}"/>
+                  <a16:creationId xmlns:a16="http://schemas.microsoft.com/office/drawing/2014/main" id="{984F5A51-375A-274D-962C-B0DE8097C389}"/>
                 </a:ext>
               </a:extLst>
             </p:cNvPr>
@@ -4759,8 +4754,7 @@
             <a:ln>
               <a:solidFill>
                 <a:schemeClr val="accent1">
-                  <a:lumMod val="20000"/>
-                  <a:lumOff val="80000"/>
+                  <a:lumMod val="75000"/>
                 </a:schemeClr>
               </a:solidFill>
             </a:ln>
@@ -4795,10 +4789,10 @@
         </p:sp>
         <p:cxnSp>
           <p:nvCxnSpPr>
-            <p:cNvPr id="93" name="Curved Connector 92">
+            <p:cNvPr id="145" name="Curved Connector 144">
               <a:extLst>
                 <a:ext uri="{FF2B5EF4-FFF2-40B4-BE49-F238E27FC236}">
-                  <a16:creationId xmlns:a16="http://schemas.microsoft.com/office/drawing/2014/main" id="{0B71F5EA-BDF9-DB41-9C2A-13E0FB5091B8}"/>
+                  <a16:creationId xmlns:a16="http://schemas.microsoft.com/office/drawing/2014/main" id="{A8FDFF9B-C465-1C42-A1E1-EAE05713940A}"/>
                 </a:ext>
               </a:extLst>
             </p:cNvPr>
@@ -4809,7 +4803,7 @@
           </p:nvCxnSpPr>
           <p:spPr>
             <a:xfrm rot="10800000" flipV="1">
-              <a:off x="8673352" y="2305385"/>
+              <a:off x="8686604" y="2292133"/>
               <a:ext cx="162256" cy="82498"/>
             </a:xfrm>
             <a:prstGeom prst="curvedConnector3">
@@ -4820,8 +4814,7 @@
             <a:ln>
               <a:solidFill>
                 <a:schemeClr val="accent1">
-                  <a:lumMod val="20000"/>
-                  <a:lumOff val="80000"/>
+                  <a:lumMod val="75000"/>
                 </a:schemeClr>
               </a:solidFill>
               <a:prstDash val="sysDash"/>
@@ -4845,10 +4838,10 @@
         </p:cxnSp>
         <p:sp>
           <p:nvSpPr>
-            <p:cNvPr id="94" name="TextBox 93">
+            <p:cNvPr id="146" name="TextBox 145">
               <a:extLst>
                 <a:ext uri="{FF2B5EF4-FFF2-40B4-BE49-F238E27FC236}">
-                  <a16:creationId xmlns:a16="http://schemas.microsoft.com/office/drawing/2014/main" id="{89D66DDC-650B-B04E-A628-11362B67C64C}"/>
+                  <a16:creationId xmlns:a16="http://schemas.microsoft.com/office/drawing/2014/main" id="{88F2E7FF-7F1D-B94B-B404-961EB48EAF18}"/>
                 </a:ext>
               </a:extLst>
             </p:cNvPr>
@@ -4883,10 +4876,10 @@
         </p:sp>
         <p:sp>
           <p:nvSpPr>
-            <p:cNvPr id="95" name="TextBox 94">
+            <p:cNvPr id="147" name="TextBox 146">
               <a:extLst>
                 <a:ext uri="{FF2B5EF4-FFF2-40B4-BE49-F238E27FC236}">
-                  <a16:creationId xmlns:a16="http://schemas.microsoft.com/office/drawing/2014/main" id="{69BE7C96-1CFC-EE49-8AF8-90AA776262E4}"/>
+                  <a16:creationId xmlns:a16="http://schemas.microsoft.com/office/drawing/2014/main" id="{B636C7E5-B9D7-D040-BF34-F231FF2F7764}"/>
                 </a:ext>
               </a:extLst>
             </p:cNvPr>
@@ -4907,6 +4900,13 @@
                 <a:lumOff val="40000"/>
               </a:schemeClr>
             </a:solidFill>
+            <a:ln>
+              <a:solidFill>
+                <a:schemeClr val="accent6">
+                  <a:lumMod val="75000"/>
+                </a:schemeClr>
+              </a:solidFill>
+            </a:ln>
           </p:spPr>
           <p:txBody>
             <a:bodyPr wrap="square" rtlCol="0" anchor="ctr">
@@ -4927,17 +4927,17 @@
         </p:sp>
         <p:cxnSp>
           <p:nvCxnSpPr>
-            <p:cNvPr id="96" name="Straight Connector 95">
+            <p:cNvPr id="148" name="Straight Connector 147">
               <a:extLst>
                 <a:ext uri="{FF2B5EF4-FFF2-40B4-BE49-F238E27FC236}">
-                  <a16:creationId xmlns:a16="http://schemas.microsoft.com/office/drawing/2014/main" id="{11213A4B-02ED-EE43-A59B-46B124103A89}"/>
+                  <a16:creationId xmlns:a16="http://schemas.microsoft.com/office/drawing/2014/main" id="{79FA7F51-899F-CC46-B1E6-9FEF19AB9E34}"/>
                 </a:ext>
               </a:extLst>
             </p:cNvPr>
             <p:cNvCxnSpPr>
               <a:cxnSpLocks/>
-              <a:stCxn id="95" idx="2"/>
-              <a:endCxn id="97" idx="0"/>
+              <a:stCxn id="147" idx="2"/>
+              <a:endCxn id="149" idx="0"/>
             </p:cNvCxnSpPr>
             <p:nvPr/>
           </p:nvCxnSpPr>
@@ -4952,8 +4952,7 @@
             <a:ln>
               <a:solidFill>
                 <a:schemeClr val="accent6">
-                  <a:lumMod val="60000"/>
-                  <a:lumOff val="40000"/>
+                  <a:lumMod val="75000"/>
                 </a:schemeClr>
               </a:solidFill>
               <a:prstDash val="sysDash"/>
@@ -4976,10 +4975,10 @@
         </p:cxnSp>
         <p:sp>
           <p:nvSpPr>
-            <p:cNvPr id="97" name="Rectangle 96">
+            <p:cNvPr id="149" name="Rectangle 148">
               <a:extLst>
                 <a:ext uri="{FF2B5EF4-FFF2-40B4-BE49-F238E27FC236}">
-                  <a16:creationId xmlns:a16="http://schemas.microsoft.com/office/drawing/2014/main" id="{4D82D880-5776-A54F-9003-DEF0A70534F2}"/>
+                  <a16:creationId xmlns:a16="http://schemas.microsoft.com/office/drawing/2014/main" id="{2458A8D4-8691-A34A-B618-6CCBE636D810}"/>
                 </a:ext>
               </a:extLst>
             </p:cNvPr>
@@ -4998,8 +4997,7 @@
             <a:ln>
               <a:solidFill>
                 <a:schemeClr val="accent6">
-                  <a:lumMod val="60000"/>
-                  <a:lumOff val="40000"/>
+                  <a:lumMod val="75000"/>
                 </a:schemeClr>
               </a:solidFill>
             </a:ln>
@@ -5034,10 +5032,10 @@
         </p:sp>
         <p:sp>
           <p:nvSpPr>
-            <p:cNvPr id="98" name="TextBox 97">
+            <p:cNvPr id="150" name="TextBox 149">
               <a:extLst>
                 <a:ext uri="{FF2B5EF4-FFF2-40B4-BE49-F238E27FC236}">
-                  <a16:creationId xmlns:a16="http://schemas.microsoft.com/office/drawing/2014/main" id="{E7C73038-3647-FB42-9264-C63D6A10A3A8}"/>
+                  <a16:creationId xmlns:a16="http://schemas.microsoft.com/office/drawing/2014/main" id="{AD1D19E0-7DCB-CA44-B088-44603F76D0F9}"/>
                 </a:ext>
               </a:extLst>
             </p:cNvPr>
@@ -5072,10 +5070,10 @@
         </p:sp>
         <p:sp>
           <p:nvSpPr>
-            <p:cNvPr id="99" name="Rectangle 98">
+            <p:cNvPr id="151" name="Rectangle 150">
               <a:extLst>
                 <a:ext uri="{FF2B5EF4-FFF2-40B4-BE49-F238E27FC236}">
-                  <a16:creationId xmlns:a16="http://schemas.microsoft.com/office/drawing/2014/main" id="{C142C2C4-37B1-FF42-BE38-D95CF82D89D7}"/>
+                  <a16:creationId xmlns:a16="http://schemas.microsoft.com/office/drawing/2014/main" id="{75ADCD64-E33A-634F-80FC-2F32C789B242}"/>
                 </a:ext>
               </a:extLst>
             </p:cNvPr>
@@ -5099,8 +5097,7 @@
             <a:ln>
               <a:solidFill>
                 <a:schemeClr val="accent1">
-                  <a:lumMod val="20000"/>
-                  <a:lumOff val="80000"/>
+                  <a:lumMod val="75000"/>
                 </a:schemeClr>
               </a:solidFill>
             </a:ln>
@@ -5135,10 +5132,10 @@
         </p:sp>
         <p:sp>
           <p:nvSpPr>
-            <p:cNvPr id="100" name="TextBox 99">
+            <p:cNvPr id="152" name="TextBox 151">
               <a:extLst>
                 <a:ext uri="{FF2B5EF4-FFF2-40B4-BE49-F238E27FC236}">
-                  <a16:creationId xmlns:a16="http://schemas.microsoft.com/office/drawing/2014/main" id="{CB898B95-D68B-134D-BAAE-423524EAC4C9}"/>
+                  <a16:creationId xmlns:a16="http://schemas.microsoft.com/office/drawing/2014/main" id="{1753D4F0-0162-584E-83F4-6CD37F110491}"/>
                 </a:ext>
               </a:extLst>
             </p:cNvPr>
@@ -5173,10 +5170,10 @@
         </p:sp>
         <p:sp>
           <p:nvSpPr>
-            <p:cNvPr id="101" name="Rectangle 100">
+            <p:cNvPr id="153" name="Rectangle 152">
               <a:extLst>
                 <a:ext uri="{FF2B5EF4-FFF2-40B4-BE49-F238E27FC236}">
-                  <a16:creationId xmlns:a16="http://schemas.microsoft.com/office/drawing/2014/main" id="{51F19ADB-926F-7E46-B899-DA04CFDCFA23}"/>
+                  <a16:creationId xmlns:a16="http://schemas.microsoft.com/office/drawing/2014/main" id="{CE4F384F-622F-654E-9167-1075115C597F}"/>
                 </a:ext>
               </a:extLst>
             </p:cNvPr>
@@ -5185,8 +5182,8 @@
           </p:nvSpPr>
           <p:spPr>
             <a:xfrm>
-              <a:off x="11238841" y="3861358"/>
-              <a:ext cx="121092" cy="557481"/>
+              <a:off x="11238841" y="3861359"/>
+              <a:ext cx="121082" cy="465468"/>
             </a:xfrm>
             <a:prstGeom prst="rect">
               <a:avLst/>
@@ -5195,8 +5192,7 @@
             <a:ln>
               <a:solidFill>
                 <a:schemeClr val="accent6">
-                  <a:lumMod val="60000"/>
-                  <a:lumOff val="40000"/>
+                  <a:lumMod val="75000"/>
                 </a:schemeClr>
               </a:solidFill>
             </a:ln>
@@ -5231,24 +5227,24 @@
         </p:sp>
         <p:cxnSp>
           <p:nvCxnSpPr>
-            <p:cNvPr id="102" name="Straight Connector 101">
+            <p:cNvPr id="154" name="Straight Connector 153">
               <a:extLst>
                 <a:ext uri="{FF2B5EF4-FFF2-40B4-BE49-F238E27FC236}">
-                  <a16:creationId xmlns:a16="http://schemas.microsoft.com/office/drawing/2014/main" id="{863A639A-3061-3D46-AAE2-7DA89833B2D2}"/>
+                  <a16:creationId xmlns:a16="http://schemas.microsoft.com/office/drawing/2014/main" id="{7F441666-B0A6-0B42-A930-FA7DC0AEDE9B}"/>
                 </a:ext>
               </a:extLst>
             </p:cNvPr>
             <p:cNvCxnSpPr>
               <a:cxnSpLocks/>
-              <a:stCxn id="97" idx="2"/>
-              <a:endCxn id="101" idx="0"/>
+              <a:stCxn id="149" idx="2"/>
+              <a:endCxn id="153" idx="0"/>
             </p:cNvCxnSpPr>
             <p:nvPr/>
           </p:nvCxnSpPr>
           <p:spPr>
             <a:xfrm>
               <a:off x="11297043" y="3318389"/>
-              <a:ext cx="2344" cy="542969"/>
+              <a:ext cx="2339" cy="542970"/>
             </a:xfrm>
             <a:prstGeom prst="line">
               <a:avLst/>
@@ -5256,8 +5252,7 @@
             <a:ln>
               <a:solidFill>
                 <a:schemeClr val="accent6">
-                  <a:lumMod val="60000"/>
-                  <a:lumOff val="40000"/>
+                  <a:lumMod val="75000"/>
                 </a:schemeClr>
               </a:solidFill>
               <a:prstDash val="sysDash"/>
@@ -5280,10 +5275,10 @@
         </p:cxnSp>
         <p:sp>
           <p:nvSpPr>
-            <p:cNvPr id="103" name="Rectangle 102">
+            <p:cNvPr id="155" name="Rectangle 154">
               <a:extLst>
                 <a:ext uri="{FF2B5EF4-FFF2-40B4-BE49-F238E27FC236}">
-                  <a16:creationId xmlns:a16="http://schemas.microsoft.com/office/drawing/2014/main" id="{60CDC2F7-5CE2-C64E-A1F0-DD153622D1EC}"/>
+                  <a16:creationId xmlns:a16="http://schemas.microsoft.com/office/drawing/2014/main" id="{0149D839-D599-CC40-B486-D84BA3784C09}"/>
                 </a:ext>
               </a:extLst>
             </p:cNvPr>
@@ -5334,10 +5329,10 @@
         </p:sp>
         <p:cxnSp>
           <p:nvCxnSpPr>
-            <p:cNvPr id="104" name="Straight Arrow Connector 103">
+            <p:cNvPr id="156" name="Straight Arrow Connector 155">
               <a:extLst>
                 <a:ext uri="{FF2B5EF4-FFF2-40B4-BE49-F238E27FC236}">
-                  <a16:creationId xmlns:a16="http://schemas.microsoft.com/office/drawing/2014/main" id="{CE0633FF-5791-9841-BFED-F5FF66415BBF}"/>
+                  <a16:creationId xmlns:a16="http://schemas.microsoft.com/office/drawing/2014/main" id="{ADBFFF78-D231-1344-BFF9-451312ECC754}"/>
                 </a:ext>
               </a:extLst>
             </p:cNvPr>
@@ -5348,7 +5343,7 @@
           </p:nvCxnSpPr>
           <p:spPr>
             <a:xfrm flipH="1" flipV="1">
-              <a:off x="8794883" y="4418391"/>
+              <a:off x="8793107" y="4320029"/>
               <a:ext cx="2504504" cy="6798"/>
             </a:xfrm>
             <a:prstGeom prst="straightConnector1">
@@ -5357,8 +5352,7 @@
             <a:ln>
               <a:solidFill>
                 <a:schemeClr val="accent1">
-                  <a:lumMod val="20000"/>
-                  <a:lumOff val="80000"/>
+                  <a:lumMod val="75000"/>
                 </a:schemeClr>
               </a:solidFill>
               <a:prstDash val="sysDash"/>
@@ -5382,22 +5376,21 @@
         </p:cxnSp>
         <p:cxnSp>
           <p:nvCxnSpPr>
-            <p:cNvPr id="105" name="Straight Connector 104">
+            <p:cNvPr id="157" name="Straight Connector 156">
               <a:extLst>
                 <a:ext uri="{FF2B5EF4-FFF2-40B4-BE49-F238E27FC236}">
-                  <a16:creationId xmlns:a16="http://schemas.microsoft.com/office/drawing/2014/main" id="{4A4D0F08-7F39-CD42-A86E-5F7266FB9521}"/>
+                  <a16:creationId xmlns:a16="http://schemas.microsoft.com/office/drawing/2014/main" id="{BB47BDB3-7CD4-8145-BAAE-A2CA99C480AB}"/>
                 </a:ext>
               </a:extLst>
             </p:cNvPr>
             <p:cNvCxnSpPr>
               <a:cxnSpLocks/>
-              <a:stCxn id="71" idx="2"/>
             </p:cNvCxnSpPr>
             <p:nvPr/>
           </p:nvCxnSpPr>
           <p:spPr>
             <a:xfrm>
-              <a:off x="2450194" y="5911980"/>
+              <a:off x="2450194" y="5922704"/>
               <a:ext cx="2959" cy="323736"/>
             </a:xfrm>
             <a:prstGeom prst="line">
@@ -5405,10 +5398,7 @@
             </a:prstGeom>
             <a:ln>
               <a:solidFill>
-                <a:schemeClr val="tx2">
-                  <a:lumMod val="40000"/>
-                  <a:lumOff val="60000"/>
-                </a:schemeClr>
+                <a:schemeClr val="tx2"/>
               </a:solidFill>
               <a:prstDash val="sysDash"/>
             </a:ln>
@@ -5430,10 +5420,10 @@
         </p:cxnSp>
         <p:sp>
           <p:nvSpPr>
-            <p:cNvPr id="106" name="TextBox 105">
+            <p:cNvPr id="158" name="TextBox 157">
               <a:extLst>
                 <a:ext uri="{FF2B5EF4-FFF2-40B4-BE49-F238E27FC236}">
-                  <a16:creationId xmlns:a16="http://schemas.microsoft.com/office/drawing/2014/main" id="{1DF582CE-BA56-A446-80A1-E86422206647}"/>
+                  <a16:creationId xmlns:a16="http://schemas.microsoft.com/office/drawing/2014/main" id="{F9F9F30E-CD7C-DD4A-8944-ED90FDEC2B98}"/>
                 </a:ext>
               </a:extLst>
             </p:cNvPr>
@@ -5443,12 +5433,15 @@
           <p:spPr>
             <a:xfrm>
               <a:off x="2311603" y="6050056"/>
-              <a:ext cx="304892" cy="369332"/>
+              <a:ext cx="290464" cy="323165"/>
             </a:xfrm>
             <a:prstGeom prst="rect">
               <a:avLst/>
             </a:prstGeom>
             <a:noFill/>
+            <a:ln>
+              <a:noFill/>
+            </a:ln>
           </p:spPr>
           <p:txBody>
             <a:bodyPr wrap="none" rtlCol="0">
@@ -5457,12 +5450,9 @@
             <a:lstStyle/>
             <a:p>
               <a:r>
-                <a:rPr lang="en-US">
+                <a:rPr lang="en-US" sz="1500" b="1">
                   <a:solidFill>
-                    <a:schemeClr val="tx2">
-                      <a:lumMod val="60000"/>
-                      <a:lumOff val="40000"/>
-                    </a:schemeClr>
+                    <a:schemeClr val="tx2"/>
                   </a:solidFill>
                 </a:rPr>
                 <a:t>X</a:t>
@@ -5472,16 +5462,16 @@
         </p:sp>
         <p:cxnSp>
           <p:nvCxnSpPr>
-            <p:cNvPr id="107" name="Straight Arrow Connector 106">
+            <p:cNvPr id="159" name="Straight Arrow Connector 158">
               <a:extLst>
                 <a:ext uri="{FF2B5EF4-FFF2-40B4-BE49-F238E27FC236}">
-                  <a16:creationId xmlns:a16="http://schemas.microsoft.com/office/drawing/2014/main" id="{2BE171ED-F772-AF4A-989B-0CC19312C995}"/>
+                  <a16:creationId xmlns:a16="http://schemas.microsoft.com/office/drawing/2014/main" id="{70146525-2535-5541-8A72-D02937F4748D}"/>
                 </a:ext>
               </a:extLst>
             </p:cNvPr>
             <p:cNvCxnSpPr>
               <a:cxnSpLocks/>
-              <a:stCxn id="71" idx="2"/>
+              <a:stCxn id="123" idx="2"/>
             </p:cNvCxnSpPr>
             <p:nvPr/>
           </p:nvCxnSpPr>
@@ -5495,9 +5485,8 @@
             </a:prstGeom>
             <a:ln>
               <a:solidFill>
-                <a:schemeClr val="tx2">
-                  <a:lumMod val="40000"/>
-                  <a:lumOff val="60000"/>
+                <a:schemeClr val="bg1">
+                  <a:lumMod val="50000"/>
                 </a:schemeClr>
               </a:solidFill>
               <a:prstDash val="sysDash"/>
@@ -5521,10 +5510,10 @@
         </p:cxnSp>
         <p:sp>
           <p:nvSpPr>
-            <p:cNvPr id="108" name="Rectangle 107">
+            <p:cNvPr id="160" name="Rectangle 159">
               <a:extLst>
                 <a:ext uri="{FF2B5EF4-FFF2-40B4-BE49-F238E27FC236}">
-                  <a16:creationId xmlns:a16="http://schemas.microsoft.com/office/drawing/2014/main" id="{71E17DF5-6097-EF4E-825C-14B60E5AA4A8}"/>
+                  <a16:creationId xmlns:a16="http://schemas.microsoft.com/office/drawing/2014/main" id="{17B5D259-5587-3B44-B5AA-2C316F562615}"/>
                 </a:ext>
               </a:extLst>
             </p:cNvPr>
@@ -5576,16 +5565,16 @@
         </p:sp>
         <p:cxnSp>
           <p:nvCxnSpPr>
-            <p:cNvPr id="109" name="Straight Connector 108">
+            <p:cNvPr id="161" name="Straight Connector 160">
               <a:extLst>
                 <a:ext uri="{FF2B5EF4-FFF2-40B4-BE49-F238E27FC236}">
-                  <a16:creationId xmlns:a16="http://schemas.microsoft.com/office/drawing/2014/main" id="{9CC5FCE4-364F-B247-8012-68BC4AA4E462}"/>
+                  <a16:creationId xmlns:a16="http://schemas.microsoft.com/office/drawing/2014/main" id="{EB49D4A8-FE52-674F-8C0D-216ED1AADA2E}"/>
                 </a:ext>
               </a:extLst>
             </p:cNvPr>
             <p:cNvCxnSpPr>
               <a:cxnSpLocks/>
-              <a:stCxn id="83" idx="2"/>
+              <a:stCxn id="135" idx="2"/>
             </p:cNvCxnSpPr>
             <p:nvPr/>
           </p:nvCxnSpPr>
@@ -5621,10 +5610,10 @@
         </p:cxnSp>
         <p:cxnSp>
           <p:nvCxnSpPr>
-            <p:cNvPr id="110" name="Straight Connector 109">
+            <p:cNvPr id="162" name="Straight Connector 161">
               <a:extLst>
                 <a:ext uri="{FF2B5EF4-FFF2-40B4-BE49-F238E27FC236}">
-                  <a16:creationId xmlns:a16="http://schemas.microsoft.com/office/drawing/2014/main" id="{0F1FFC0E-0BE1-7941-88CB-2BCC4D3F913C}"/>
+                  <a16:creationId xmlns:a16="http://schemas.microsoft.com/office/drawing/2014/main" id="{A2AB8EC1-82AF-D343-B94B-6F49E045BEF0}"/>
                 </a:ext>
               </a:extLst>
             </p:cNvPr>
@@ -5644,8 +5633,7 @@
             <a:ln>
               <a:solidFill>
                 <a:schemeClr val="accent1">
-                  <a:lumMod val="40000"/>
-                  <a:lumOff val="60000"/>
+                  <a:lumMod val="75000"/>
                 </a:schemeClr>
               </a:solidFill>
               <a:prstDash val="sysDash"/>
@@ -5668,22 +5656,23 @@
         </p:cxnSp>
         <p:cxnSp>
           <p:nvCxnSpPr>
-            <p:cNvPr id="111" name="Straight Connector 110">
+            <p:cNvPr id="163" name="Straight Connector 162">
               <a:extLst>
                 <a:ext uri="{FF2B5EF4-FFF2-40B4-BE49-F238E27FC236}">
-                  <a16:creationId xmlns:a16="http://schemas.microsoft.com/office/drawing/2014/main" id="{6C25FACD-8836-F742-BD97-C9E3B6A6A10E}"/>
+                  <a16:creationId xmlns:a16="http://schemas.microsoft.com/office/drawing/2014/main" id="{F481F399-B061-8D4A-98A5-23ADC9C171F8}"/>
                 </a:ext>
               </a:extLst>
             </p:cNvPr>
             <p:cNvCxnSpPr>
               <a:cxnSpLocks/>
+              <a:stCxn id="153" idx="2"/>
             </p:cNvCxnSpPr>
             <p:nvPr/>
           </p:nvCxnSpPr>
           <p:spPr>
-            <a:xfrm>
-              <a:off x="11297043" y="4418839"/>
-              <a:ext cx="0" cy="2238785"/>
+            <a:xfrm flipH="1">
+              <a:off x="11297044" y="4326827"/>
+              <a:ext cx="2338" cy="2330797"/>
             </a:xfrm>
             <a:prstGeom prst="line">
               <a:avLst/>
@@ -5691,8 +5680,7 @@
             <a:ln>
               <a:solidFill>
                 <a:schemeClr val="accent6">
-                  <a:lumMod val="60000"/>
-                  <a:lumOff val="40000"/>
+                  <a:lumMod val="75000"/>
                 </a:schemeClr>
               </a:solidFill>
               <a:prstDash val="sysDash"/>
@@ -5715,15 +5703,15 @@
         </p:cxnSp>
         <p:cxnSp>
           <p:nvCxnSpPr>
-            <p:cNvPr id="112" name="Straight Arrow Connector 111">
+            <p:cNvPr id="164" name="Straight Arrow Connector 163">
               <a:extLst>
                 <a:ext uri="{FF2B5EF4-FFF2-40B4-BE49-F238E27FC236}">
-                  <a16:creationId xmlns:a16="http://schemas.microsoft.com/office/drawing/2014/main" id="{5D689940-9C19-6F46-B067-17FD5CA5A736}"/>
+                  <a16:creationId xmlns:a16="http://schemas.microsoft.com/office/drawing/2014/main" id="{F8E2E099-DEEB-2E4F-8BB0-1A21794DEE49}"/>
                 </a:ext>
               </a:extLst>
             </p:cNvPr>
             <p:cNvCxnSpPr>
-              <a:stCxn id="88" idx="2"/>
+              <a:stCxn id="140" idx="2"/>
             </p:cNvCxnSpPr>
             <p:nvPr/>
           </p:nvCxnSpPr>
@@ -5760,16 +5748,16 @@
         </p:cxnSp>
         <p:cxnSp>
           <p:nvCxnSpPr>
-            <p:cNvPr id="113" name="Straight Arrow Connector 112">
+            <p:cNvPr id="165" name="Straight Arrow Connector 164">
               <a:extLst>
                 <a:ext uri="{FF2B5EF4-FFF2-40B4-BE49-F238E27FC236}">
-                  <a16:creationId xmlns:a16="http://schemas.microsoft.com/office/drawing/2014/main" id="{0F26DF34-C7BE-D442-B149-84329CD826FE}"/>
+                  <a16:creationId xmlns:a16="http://schemas.microsoft.com/office/drawing/2014/main" id="{1D5B0B30-3774-B547-A926-C072742A3000}"/>
                 </a:ext>
               </a:extLst>
             </p:cNvPr>
             <p:cNvCxnSpPr>
               <a:cxnSpLocks/>
-              <a:stCxn id="83" idx="2"/>
+              <a:stCxn id="135" idx="2"/>
             </p:cNvCxnSpPr>
             <p:nvPr/>
           </p:nvCxnSpPr>
@@ -5783,10 +5771,7 @@
             </a:prstGeom>
             <a:ln>
               <a:solidFill>
-                <a:schemeClr val="tx2">
-                  <a:lumMod val="40000"/>
-                  <a:lumOff val="60000"/>
-                </a:schemeClr>
+                <a:schemeClr val="tx2"/>
               </a:solidFill>
               <a:prstDash val="sysDash"/>
               <a:tailEnd type="triangle"/>
@@ -5809,10 +5794,10 @@
         </p:cxnSp>
         <p:sp>
           <p:nvSpPr>
-            <p:cNvPr id="114" name="TextBox 113">
+            <p:cNvPr id="166" name="TextBox 165">
               <a:extLst>
                 <a:ext uri="{FF2B5EF4-FFF2-40B4-BE49-F238E27FC236}">
-                  <a16:creationId xmlns:a16="http://schemas.microsoft.com/office/drawing/2014/main" id="{F9ABCF65-A63F-6A40-B995-5CBA11B94C0F}"/>
+                  <a16:creationId xmlns:a16="http://schemas.microsoft.com/office/drawing/2014/main" id="{ABEFE7A3-51DE-E84A-BB83-5BCBEC871AF2}"/>
                 </a:ext>
               </a:extLst>
             </p:cNvPr>
@@ -5836,7 +5821,7 @@
             <a:lstStyle/>
             <a:p>
               <a:r>
-                <a:rPr lang="en-US" sz="1100">
+                <a:rPr lang="en-US" sz="1100" dirty="0">
                   <a:latin typeface="Arial" panose="020B0604020202020204" pitchFamily="34" charset="0"/>
                   <a:cs typeface="Arial" panose="020B0604020202020204" pitchFamily="34" charset="0"/>
                 </a:rPr>
@@ -5847,10 +5832,10 @@
         </p:sp>
         <p:cxnSp>
           <p:nvCxnSpPr>
-            <p:cNvPr id="115" name="Straight Connector 114">
+            <p:cNvPr id="167" name="Straight Connector 166">
               <a:extLst>
                 <a:ext uri="{FF2B5EF4-FFF2-40B4-BE49-F238E27FC236}">
-                  <a16:creationId xmlns:a16="http://schemas.microsoft.com/office/drawing/2014/main" id="{0836B213-3B58-944E-816D-4E0E8B225347}"/>
+                  <a16:creationId xmlns:a16="http://schemas.microsoft.com/office/drawing/2014/main" id="{96968F94-097C-BA40-BDE5-152447DBBD7E}"/>
                 </a:ext>
               </a:extLst>
             </p:cNvPr>
@@ -5894,10 +5879,10 @@
         </p:cxnSp>
         <p:cxnSp>
           <p:nvCxnSpPr>
-            <p:cNvPr id="116" name="Straight Connector 115">
+            <p:cNvPr id="168" name="Straight Connector 167">
               <a:extLst>
                 <a:ext uri="{FF2B5EF4-FFF2-40B4-BE49-F238E27FC236}">
-                  <a16:creationId xmlns:a16="http://schemas.microsoft.com/office/drawing/2014/main" id="{20185A8A-8CE8-9641-B278-C183F4C84A13}"/>
+                  <a16:creationId xmlns:a16="http://schemas.microsoft.com/office/drawing/2014/main" id="{76201FF3-E12E-734C-8644-7C6A7C5CCA47}"/>
                 </a:ext>
               </a:extLst>
             </p:cNvPr>
@@ -5917,8 +5902,7 @@
             <a:ln>
               <a:solidFill>
                 <a:schemeClr val="accent1">
-                  <a:lumMod val="20000"/>
-                  <a:lumOff val="80000"/>
+                  <a:lumMod val="75000"/>
                 </a:schemeClr>
               </a:solidFill>
               <a:prstDash val="sysDash"/>
@@ -5941,10 +5925,10 @@
         </p:cxnSp>
         <p:cxnSp>
           <p:nvCxnSpPr>
-            <p:cNvPr id="117" name="Curved Connector 116">
+            <p:cNvPr id="169" name="Curved Connector 168">
               <a:extLst>
                 <a:ext uri="{FF2B5EF4-FFF2-40B4-BE49-F238E27FC236}">
-                  <a16:creationId xmlns:a16="http://schemas.microsoft.com/office/drawing/2014/main" id="{A5A1F425-8C2B-2C4A-84A7-FC9E007B40EE}"/>
+                  <a16:creationId xmlns:a16="http://schemas.microsoft.com/office/drawing/2014/main" id="{2BE02B02-457D-074F-9E2B-F0C2DC1C7C83}"/>
                 </a:ext>
               </a:extLst>
             </p:cNvPr>
@@ -5955,7 +5939,7 @@
           </p:nvCxnSpPr>
           <p:spPr>
             <a:xfrm rot="10800000" flipV="1">
-              <a:off x="8690121" y="4447709"/>
+              <a:off x="8698397" y="4427019"/>
               <a:ext cx="162256" cy="82498"/>
             </a:xfrm>
             <a:prstGeom prst="curvedConnector3">
@@ -5966,12 +5950,59 @@
             <a:ln>
               <a:solidFill>
                 <a:schemeClr val="accent1">
-                  <a:lumMod val="20000"/>
-                  <a:lumOff val="80000"/>
+                  <a:lumMod val="75000"/>
                 </a:schemeClr>
               </a:solidFill>
               <a:prstDash val="sysDash"/>
               <a:tailEnd type="triangle"/>
+            </a:ln>
+          </p:spPr>
+          <p:style>
+            <a:lnRef idx="1">
+              <a:schemeClr val="accent1"/>
+            </a:lnRef>
+            <a:fillRef idx="0">
+              <a:schemeClr val="accent1"/>
+            </a:fillRef>
+            <a:effectRef idx="0">
+              <a:schemeClr val="accent1"/>
+            </a:effectRef>
+            <a:fontRef idx="minor">
+              <a:schemeClr val="tx1"/>
+            </a:fontRef>
+          </p:style>
+        </p:cxnSp>
+        <p:cxnSp>
+          <p:nvCxnSpPr>
+            <p:cNvPr id="170" name="Straight Connector 169">
+              <a:extLst>
+                <a:ext uri="{FF2B5EF4-FFF2-40B4-BE49-F238E27FC236}">
+                  <a16:creationId xmlns:a16="http://schemas.microsoft.com/office/drawing/2014/main" id="{064ADA24-7309-F64F-9BE8-4660B06C7427}"/>
+                </a:ext>
+              </a:extLst>
+            </p:cNvPr>
+            <p:cNvCxnSpPr>
+              <a:cxnSpLocks/>
+              <a:stCxn id="121" idx="2"/>
+              <a:endCxn id="120" idx="0"/>
+            </p:cNvCxnSpPr>
+            <p:nvPr/>
+          </p:nvCxnSpPr>
+          <p:spPr>
+            <a:xfrm>
+              <a:off x="515480" y="407456"/>
+              <a:ext cx="0" cy="214830"/>
+            </a:xfrm>
+            <a:prstGeom prst="line">
+              <a:avLst/>
+            </a:prstGeom>
+            <a:ln>
+              <a:solidFill>
+                <a:schemeClr val="bg1">
+                  <a:lumMod val="50000"/>
+                </a:schemeClr>
+              </a:solidFill>
+              <a:prstDash val="sysDash"/>
             </a:ln>
           </p:spPr>
           <p:style>

</xml_diff>

<commit_message>
Fix Developer Guide images border cut off issue
</commit_message>
<xml_diff>
--- a/docs/diagrams/AddSavingCommand.pptx
+++ b/docs/diagrams/AddSavingCommand.pptx
@@ -3361,10 +3361,10 @@
         </p:nvGrpSpPr>
         <p:grpSpPr>
           <a:xfrm>
-            <a:off x="128735" y="205612"/>
-            <a:ext cx="11992509" cy="6551805"/>
+            <a:off x="99745" y="306195"/>
+            <a:ext cx="11923748" cy="6551805"/>
             <a:chOff x="128735" y="135273"/>
-            <a:chExt cx="11992509" cy="6551805"/>
+            <a:chExt cx="11923748" cy="6551805"/>
           </a:xfrm>
         </p:grpSpPr>
         <p:cxnSp>
@@ -4141,6 +4141,7 @@
               </a:extLst>
             </p:cNvPr>
             <p:cNvCxnSpPr>
+              <a:cxnSpLocks/>
               <a:stCxn id="127" idx="2"/>
             </p:cNvCxnSpPr>
             <p:nvPr/>
@@ -5523,13 +5524,13 @@
           <p:spPr>
             <a:xfrm>
               <a:off x="128735" y="507752"/>
-              <a:ext cx="11992509" cy="5957403"/>
+              <a:ext cx="11921411" cy="5957403"/>
             </a:xfrm>
             <a:prstGeom prst="rect">
               <a:avLst/>
             </a:prstGeom>
             <a:noFill/>
-            <a:ln>
+            <a:ln w="12700">
               <a:solidFill>
                 <a:schemeClr val="tx1">
                   <a:lumMod val="50000"/>
@@ -5711,6 +5712,7 @@
               </a:extLst>
             </p:cNvPr>
             <p:cNvCxnSpPr>
+              <a:cxnSpLocks/>
               <a:stCxn id="140" idx="2"/>
             </p:cNvCxnSpPr>
             <p:nvPr/>

</xml_diff>